<commit_message>
Added some stuff before the presentation.
</commit_message>
<xml_diff>
--- a/NHTutorial/docs/NH Presentation.pptx
+++ b/NHTutorial/docs/NH Presentation.pptx
@@ -3953,13 +3953,53 @@
         </p:spPr>
         <p:txBody>
           <a:bodyPr>
-            <a:normAutofit/>
+            <a:normAutofit fontScale="92500" lnSpcReduction="10000"/>
           </a:bodyPr>
           <a:lstStyle/>
           <a:p>
             <a:r>
-              <a:rPr lang="sl-SI" dirty="0" smtClean="0"/>
-              <a:t>Knjige:</a:t>
+              <a:rPr lang="en-US" dirty="0" smtClean="0"/>
+              <a:t>Source </a:t>
+            </a:r>
+            <a:r>
+              <a:rPr lang="en-US" dirty="0" err="1" smtClean="0"/>
+              <a:t>koda</a:t>
+            </a:r>
+            <a:r>
+              <a:rPr lang="en-US" dirty="0" smtClean="0"/>
+              <a:t>:</a:t>
+            </a:r>
+            <a:br>
+              <a:rPr lang="en-US" dirty="0" smtClean="0"/>
+            </a:br>
+            <a:r>
+              <a:rPr lang="en-US" dirty="0" smtClean="0">
+                <a:hlinkClick r:id="rId2"/>
+              </a:rPr>
+              <a:t>http</a:t>
+            </a:r>
+            <a:r>
+              <a:rPr lang="en-US" dirty="0" smtClean="0">
+                <a:hlinkClick r:id="rId2"/>
+              </a:rPr>
+              <a:t>://bitbucket.org/breki74/tutis/src/c1ffced4ef8b/NHTutorial</a:t>
+            </a:r>
+            <a:r>
+              <a:rPr lang="en-US" dirty="0" smtClean="0">
+                <a:hlinkClick r:id="rId2"/>
+              </a:rPr>
+              <a:t>/</a:t>
+            </a:r>
+            <a:endParaRPr lang="en-US" dirty="0" smtClean="0"/>
+          </a:p>
+          <a:p>
+            <a:r>
+              <a:rPr lang="sl-SI" dirty="0" smtClean="0"/>
+              <a:t>Knjige</a:t>
+            </a:r>
+            <a:r>
+              <a:rPr lang="sl-SI" dirty="0" smtClean="0"/>
+              <a:t>:</a:t>
             </a:r>
           </a:p>
           <a:p>
@@ -4004,7 +4044,7 @@
             <a:pPr lvl="1"/>
             <a:r>
               <a:rPr lang="en-US" dirty="0" smtClean="0">
-                <a:hlinkClick r:id="rId2"/>
+                <a:hlinkClick r:id="rId3"/>
               </a:rPr>
               <a:t>http://www.udidahan.com/2009/06/14/domain-events-salvation/</a:t>
             </a:r>

</xml_diff>

<commit_message>
Fixed problems with tests which were not running
</commit_message>
<xml_diff>
--- a/NHTutorial/docs/NH Presentation.pptx
+++ b/NHTutorial/docs/NH Presentation.pptx
@@ -3890,6 +3890,13 @@
   <p:clrMapOvr>
     <a:masterClrMapping/>
   </p:clrMapOvr>
+  <p:timing>
+    <p:tnLst>
+      <p:par>
+        <p:cTn id="1" dur="indefinite" restart="never" nodeType="tmRoot"/>
+      </p:par>
+    </p:tnLst>
+  </p:timing>
 </p:sld>
 </file>
 
@@ -4147,6 +4154,13 @@
   <p:clrMapOvr>
     <a:masterClrMapping/>
   </p:clrMapOvr>
+  <p:timing>
+    <p:tnLst>
+      <p:par>
+        <p:cTn id="1" dur="indefinite" restart="never" nodeType="tmRoot"/>
+      </p:par>
+    </p:tnLst>
+  </p:timing>
 </p:sld>
 </file>
 
@@ -4278,6 +4292,13 @@
   <p:clrMapOvr>
     <a:masterClrMapping/>
   </p:clrMapOvr>
+  <p:timing>
+    <p:tnLst>
+      <p:par>
+        <p:cTn id="1" dur="indefinite" restart="never" nodeType="tmRoot"/>
+      </p:par>
+    </p:tnLst>
+  </p:timing>
 </p:sld>
 </file>
 
@@ -4381,6 +4402,13 @@
   <p:clrMapOvr>
     <a:masterClrMapping/>
   </p:clrMapOvr>
+  <p:timing>
+    <p:tnLst>
+      <p:par>
+        <p:cTn id="1" dur="indefinite" restart="never" nodeType="tmRoot"/>
+      </p:par>
+    </p:tnLst>
+  </p:timing>
 </p:sld>
 </file>
 
@@ -4476,6 +4504,13 @@
   <p:clrMapOvr>
     <a:masterClrMapping/>
   </p:clrMapOvr>
+  <p:timing>
+    <p:tnLst>
+      <p:par>
+        <p:cTn id="1" dur="indefinite" restart="never" nodeType="tmRoot"/>
+      </p:par>
+    </p:tnLst>
+  </p:timing>
 </p:sld>
 </file>
 
@@ -4610,6 +4645,13 @@
   <p:clrMapOvr>
     <a:masterClrMapping/>
   </p:clrMapOvr>
+  <p:timing>
+    <p:tnLst>
+      <p:par>
+        <p:cTn id="1" dur="indefinite" restart="never" nodeType="tmRoot"/>
+      </p:par>
+    </p:tnLst>
+  </p:timing>
 </p:sld>
 </file>
 
@@ -4750,6 +4792,13 @@
   <p:clrMapOvr>
     <a:masterClrMapping/>
   </p:clrMapOvr>
+  <p:timing>
+    <p:tnLst>
+      <p:par>
+        <p:cTn id="1" dur="indefinite" restart="never" nodeType="tmRoot"/>
+      </p:par>
+    </p:tnLst>
+  </p:timing>
 </p:sld>
 </file>
 
@@ -4931,6 +4980,13 @@
   <p:clrMapOvr>
     <a:masterClrMapping/>
   </p:clrMapOvr>
+  <p:timing>
+    <p:tnLst>
+      <p:par>
+        <p:cTn id="1" dur="indefinite" restart="never" nodeType="tmRoot"/>
+      </p:par>
+    </p:tnLst>
+  </p:timing>
 </p:sld>
 </file>
 
@@ -5031,6 +5087,13 @@
   <p:clrMapOvr>
     <a:masterClrMapping/>
   </p:clrMapOvr>
+  <p:timing>
+    <p:tnLst>
+      <p:par>
+        <p:cTn id="1" dur="indefinite" restart="never" nodeType="tmRoot"/>
+      </p:par>
+    </p:tnLst>
+  </p:timing>
 </p:sld>
 </file>
 

</xml_diff>